<commit_message>
Added slides on version vectors
</commit_message>
<xml_diff>
--- a/presentation/slides_daniel.pptx
+++ b/presentation/slides_daniel.pptx
@@ -5,7 +5,7 @@
     <p:sldMasterId id="2147483648" r:id="rId1"/>
   </p:sldMasterIdLst>
   <p:notesMasterIdLst>
-    <p:notesMasterId r:id="rId24"/>
+    <p:notesMasterId r:id="rId25"/>
   </p:notesMasterIdLst>
   <p:sldIdLst>
     <p:sldId id="256" r:id="rId2"/>
@@ -30,6 +30,7 @@
     <p:sldId id="273" r:id="rId21"/>
     <p:sldId id="274" r:id="rId22"/>
     <p:sldId id="275" r:id="rId23"/>
+    <p:sldId id="280" r:id="rId24"/>
   </p:sldIdLst>
   <p:sldSz cx="9144000" cy="6858000" type="screen4x3"/>
   <p:notesSz cx="6858000" cy="9144000"/>
@@ -7430,9 +7431,26 @@
           <a:p>
             <a:pPr lvl="1"/>
             <a:r>
-              <a:rPr lang="hu-HU" smtClean="0"/>
-              <a:t>Clock – logical clock value</a:t>
-            </a:r>
+              <a:rPr lang="hu-HU" dirty="0" smtClean="0"/>
+              <a:t>Clock – logical clock </a:t>
+            </a:r>
+            <a:r>
+              <a:rPr lang="hu-HU" dirty="0" smtClean="0"/>
+              <a:t>value</a:t>
+            </a:r>
+          </a:p>
+          <a:p>
+            <a:r>
+              <a:rPr lang="hu-HU" dirty="0" smtClean="0"/>
+              <a:t>The clock value describes the last seen WID</a:t>
+            </a:r>
+          </a:p>
+          <a:p>
+            <a:r>
+              <a:rPr lang="hu-HU" dirty="0" smtClean="0"/>
+              <a:t>Updated as a part of the anti-entropy process</a:t>
+            </a:r>
+            <a:endParaRPr lang="hu-HU" dirty="0" smtClean="0"/>
           </a:p>
           <a:p>
             <a:endParaRPr lang="hu-HU" dirty="0"/>
@@ -7446,6 +7464,141 @@
     <p:extLst>
       <p:ext uri="{BB962C8B-B14F-4D97-AF65-F5344CB8AC3E}">
         <p14:creationId xmlns:p14="http://schemas.microsoft.com/office/powerpoint/2010/main" val="3572500862"/>
+      </p:ext>
+    </p:extLst>
+  </p:cSld>
+  <p:clrMapOvr>
+    <a:masterClrMapping/>
+  </p:clrMapOvr>
+</p:sld>
+</file>
+
+<file path=ppt/slides/slide23.xml><?xml version="1.0" encoding="utf-8"?>
+<p:sld xmlns:a="http://schemas.openxmlformats.org/drawingml/2006/main" xmlns:r="http://schemas.openxmlformats.org/officeDocument/2006/relationships" xmlns:p="http://schemas.openxmlformats.org/presentationml/2006/main">
+  <p:cSld>
+    <p:spTree>
+      <p:nvGrpSpPr>
+        <p:cNvPr id="1" name=""/>
+        <p:cNvGrpSpPr/>
+        <p:nvPr/>
+      </p:nvGrpSpPr>
+      <p:grpSpPr>
+        <a:xfrm>
+          <a:off x="0" y="0"/>
+          <a:ext cx="0" cy="0"/>
+          <a:chOff x="0" y="0"/>
+          <a:chExt cx="0" cy="0"/>
+        </a:xfrm>
+      </p:grpSpPr>
+      <p:sp>
+        <p:nvSpPr>
+          <p:cNvPr id="2" name="Title 1"/>
+          <p:cNvSpPr>
+            <a:spLocks noGrp="1"/>
+          </p:cNvSpPr>
+          <p:nvPr>
+            <p:ph type="title"/>
+          </p:nvPr>
+        </p:nvSpPr>
+        <p:spPr/>
+        <p:txBody>
+          <a:bodyPr/>
+          <a:lstStyle/>
+          <a:p>
+            <a:r>
+              <a:rPr lang="hu-HU" dirty="0" smtClean="0"/>
+              <a:t>Version Vectors in Action</a:t>
+            </a:r>
+            <a:endParaRPr lang="hu-HU" dirty="0"/>
+          </a:p>
+        </p:txBody>
+      </p:sp>
+      <p:sp>
+        <p:nvSpPr>
+          <p:cNvPr id="3" name="Content Placeholder 2"/>
+          <p:cNvSpPr>
+            <a:spLocks noGrp="1"/>
+          </p:cNvSpPr>
+          <p:nvPr>
+            <p:ph idx="1"/>
+          </p:nvPr>
+        </p:nvSpPr>
+        <p:spPr/>
+        <p:txBody>
+          <a:bodyPr>
+            <a:normAutofit lnSpcReduction="10000"/>
+          </a:bodyPr>
+          <a:lstStyle/>
+          <a:p>
+            <a:r>
+              <a:rPr lang="hu-HU" dirty="0" smtClean="0"/>
+              <a:t>Representation of a WID set Ws</a:t>
+            </a:r>
+          </a:p>
+          <a:p>
+            <a:pPr lvl="1"/>
+            <a:r>
+              <a:rPr lang="hu-HU" dirty="0" smtClean="0"/>
+              <a:t>V[S] = time of latest WID assigned in Ws (or 0)</a:t>
+            </a:r>
+          </a:p>
+          <a:p>
+            <a:r>
+              <a:rPr lang="hu-HU" b="1" dirty="0" smtClean="0"/>
+              <a:t>Union</a:t>
+            </a:r>
+            <a:r>
+              <a:rPr lang="hu-HU" dirty="0" smtClean="0"/>
+              <a:t> of WID sets Ws1 and Ws2</a:t>
+            </a:r>
+          </a:p>
+          <a:p>
+            <a:pPr lvl="1"/>
+            <a:r>
+              <a:rPr lang="hu-HU" dirty="0" smtClean="0"/>
+              <a:t>V[S] = MAX(V1[S], V2[S]) for all S</a:t>
+            </a:r>
+          </a:p>
+          <a:p>
+            <a:r>
+              <a:rPr lang="hu-HU" dirty="0" smtClean="0"/>
+              <a:t>Check if Ws1 is a </a:t>
+            </a:r>
+            <a:r>
+              <a:rPr lang="hu-HU" b="1" dirty="0" smtClean="0"/>
+              <a:t>subset</a:t>
+            </a:r>
+            <a:r>
+              <a:rPr lang="hu-HU" dirty="0" smtClean="0"/>
+              <a:t> of Ws2</a:t>
+            </a:r>
+          </a:p>
+          <a:p>
+            <a:pPr lvl="1"/>
+            <a:r>
+              <a:rPr lang="hu-HU" dirty="0" smtClean="0"/>
+              <a:t>V2[S] &gt; V1[S] for all S</a:t>
+            </a:r>
+          </a:p>
+          <a:p>
+            <a:r>
+              <a:rPr lang="hu-HU" dirty="0" smtClean="0"/>
+              <a:t>We can use a VV for Writes and Reads</a:t>
+            </a:r>
+          </a:p>
+          <a:p>
+            <a:r>
+              <a:rPr lang="hu-HU" smtClean="0"/>
+              <a:t>To find acceptable servers, we need dominating Version Vectors</a:t>
+            </a:r>
+            <a:endParaRPr lang="hu-HU" dirty="0"/>
+          </a:p>
+        </p:txBody>
+      </p:sp>
+    </p:spTree>
+    <p:extLst>
+      <p:ext uri="{BB962C8B-B14F-4D97-AF65-F5344CB8AC3E}">
+        <p14:creationId xmlns:p14="http://schemas.microsoft.com/office/powerpoint/2010/main" val="2050914982"/>
       </p:ext>
     </p:extLst>
   </p:cSld>

</xml_diff>

<commit_message>
small change in slide: 2 – Monotonic Reads
</commit_message>
<xml_diff>
--- a/presentation/slides_daniel.pptx
+++ b/presentation/slides_daniel.pptx
@@ -236,7 +236,7 @@
           <a:p>
             <a:fld id="{7DE1F189-47AF-4643-B438-A16D154135D4}" type="datetimeFigureOut">
               <a:rPr lang="hu-HU" smtClean="0"/>
-              <a:t>2014.03.26.</a:t>
+              <a:t>2014.03.27.</a:t>
             </a:fld>
             <a:endParaRPr lang="hu-HU"/>
           </a:p>
@@ -1511,7 +1511,7 @@
           <a:p>
             <a:fld id="{78F7501C-0FBA-4912-B930-6291D1759BC9}" type="datetimeFigureOut">
               <a:rPr lang="hu-HU" smtClean="0"/>
-              <a:t>2014.03.26.</a:t>
+              <a:t>2014.03.27.</a:t>
             </a:fld>
             <a:endParaRPr lang="hu-HU"/>
           </a:p>
@@ -1681,7 +1681,7 @@
           <a:p>
             <a:fld id="{78F7501C-0FBA-4912-B930-6291D1759BC9}" type="datetimeFigureOut">
               <a:rPr lang="hu-HU" smtClean="0"/>
-              <a:t>2014.03.26.</a:t>
+              <a:t>2014.03.27.</a:t>
             </a:fld>
             <a:endParaRPr lang="hu-HU"/>
           </a:p>
@@ -1861,7 +1861,7 @@
           <a:p>
             <a:fld id="{78F7501C-0FBA-4912-B930-6291D1759BC9}" type="datetimeFigureOut">
               <a:rPr lang="hu-HU" smtClean="0"/>
-              <a:t>2014.03.26.</a:t>
+              <a:t>2014.03.27.</a:t>
             </a:fld>
             <a:endParaRPr lang="hu-HU"/>
           </a:p>
@@ -2031,7 +2031,7 @@
           <a:p>
             <a:fld id="{78F7501C-0FBA-4912-B930-6291D1759BC9}" type="datetimeFigureOut">
               <a:rPr lang="hu-HU" smtClean="0"/>
-              <a:t>2014.03.26.</a:t>
+              <a:t>2014.03.27.</a:t>
             </a:fld>
             <a:endParaRPr lang="hu-HU"/>
           </a:p>
@@ -2277,7 +2277,7 @@
           <a:p>
             <a:fld id="{78F7501C-0FBA-4912-B930-6291D1759BC9}" type="datetimeFigureOut">
               <a:rPr lang="hu-HU" smtClean="0"/>
-              <a:t>2014.03.26.</a:t>
+              <a:t>2014.03.27.</a:t>
             </a:fld>
             <a:endParaRPr lang="hu-HU"/>
           </a:p>
@@ -2565,7 +2565,7 @@
           <a:p>
             <a:fld id="{78F7501C-0FBA-4912-B930-6291D1759BC9}" type="datetimeFigureOut">
               <a:rPr lang="hu-HU" smtClean="0"/>
-              <a:t>2014.03.26.</a:t>
+              <a:t>2014.03.27.</a:t>
             </a:fld>
             <a:endParaRPr lang="hu-HU"/>
           </a:p>
@@ -2987,7 +2987,7 @@
           <a:p>
             <a:fld id="{78F7501C-0FBA-4912-B930-6291D1759BC9}" type="datetimeFigureOut">
               <a:rPr lang="hu-HU" smtClean="0"/>
-              <a:t>2014.03.26.</a:t>
+              <a:t>2014.03.27.</a:t>
             </a:fld>
             <a:endParaRPr lang="hu-HU"/>
           </a:p>
@@ -3105,7 +3105,7 @@
           <a:p>
             <a:fld id="{78F7501C-0FBA-4912-B930-6291D1759BC9}" type="datetimeFigureOut">
               <a:rPr lang="hu-HU" smtClean="0"/>
-              <a:t>2014.03.26.</a:t>
+              <a:t>2014.03.27.</a:t>
             </a:fld>
             <a:endParaRPr lang="hu-HU"/>
           </a:p>
@@ -3200,7 +3200,7 @@
           <a:p>
             <a:fld id="{78F7501C-0FBA-4912-B930-6291D1759BC9}" type="datetimeFigureOut">
               <a:rPr lang="hu-HU" smtClean="0"/>
-              <a:t>2014.03.26.</a:t>
+              <a:t>2014.03.27.</a:t>
             </a:fld>
             <a:endParaRPr lang="hu-HU"/>
           </a:p>
@@ -3477,7 +3477,7 @@
           <a:p>
             <a:fld id="{78F7501C-0FBA-4912-B930-6291D1759BC9}" type="datetimeFigureOut">
               <a:rPr lang="hu-HU" smtClean="0"/>
-              <a:t>2014.03.26.</a:t>
+              <a:t>2014.03.27.</a:t>
             </a:fld>
             <a:endParaRPr lang="hu-HU"/>
           </a:p>
@@ -3730,7 +3730,7 @@
           <a:p>
             <a:fld id="{78F7501C-0FBA-4912-B930-6291D1759BC9}" type="datetimeFigureOut">
               <a:rPr lang="hu-HU" smtClean="0"/>
-              <a:t>2014.03.26.</a:t>
+              <a:t>2014.03.27.</a:t>
             </a:fld>
             <a:endParaRPr lang="hu-HU"/>
           </a:p>
@@ -3943,7 +3943,7 @@
           <a:p>
             <a:fld id="{78F7501C-0FBA-4912-B930-6291D1759BC9}" type="datetimeFigureOut">
               <a:rPr lang="hu-HU" smtClean="0"/>
-              <a:t>2014.03.26.</a:t>
+              <a:t>2014.03.27.</a:t>
             </a:fld>
             <a:endParaRPr lang="hu-HU"/>
           </a:p>
@@ -4680,7 +4680,6 @@
               <a:rPr lang="hu-HU" dirty="0"/>
               <a:t>1 – Read Your Writes</a:t>
             </a:r>
-            <a:endParaRPr lang="hu-HU" dirty="0"/>
           </a:p>
         </p:txBody>
       </p:sp>
@@ -5206,11 +5205,7 @@
           <a:p>
             <a:r>
               <a:rPr lang="hu-HU" dirty="0" smtClean="0"/>
-              <a:t>If Read R follows Write W in a session and R is performed at server S at time t, then W is included in DB(S, t</a:t>
-            </a:r>
-            <a:r>
-              <a:rPr lang="hu-HU" dirty="0" smtClean="0"/>
-              <a:t>)</a:t>
+              <a:t>If Read R follows Write W in a session and R is performed at server S at time t, then W is included in DB(S, t)</a:t>
             </a:r>
             <a:endParaRPr lang="en-US" dirty="0" smtClean="0"/>
           </a:p>
@@ -5315,7 +5310,6 @@
               <a:rPr lang="hu-HU" dirty="0"/>
               <a:t>2 – Monotonic Reads</a:t>
             </a:r>
-            <a:endParaRPr lang="hu-HU" dirty="0"/>
           </a:p>
         </p:txBody>
       </p:sp>
@@ -5830,7 +5824,15 @@
               <a:pPr algn="ctr"/>
               <a:r>
                 <a:rPr lang="en-US" sz="2800" dirty="0" smtClean="0"/>
-                <a:t>Write by C : W2</a:t>
+                <a:t>Write by C </a:t>
+              </a:r>
+              <a:r>
+                <a:rPr lang="en-US" sz="2800" smtClean="0"/>
+                <a:t>: </a:t>
+              </a:r>
+              <a:r>
+                <a:rPr lang="en-US" sz="2800" smtClean="0"/>
+                <a:t>W3</a:t>
               </a:r>
               <a:endParaRPr lang="en-US" sz="2800" dirty="0"/>
             </a:p>
@@ -6268,7 +6270,6 @@
               <a:rPr lang="hu-HU" dirty="0"/>
               <a:t>3 – Writes Follow Reads</a:t>
             </a:r>
-            <a:endParaRPr lang="hu-HU" dirty="0"/>
           </a:p>
         </p:txBody>
       </p:sp>
@@ -7105,11 +7106,7 @@
             </a:r>
             <a:r>
               <a:rPr lang="hu-HU" dirty="0" smtClean="0"/>
-              <a:t> </a:t>
-            </a:r>
-            <a:r>
-              <a:rPr lang="hu-HU" dirty="0" smtClean="0"/>
-              <a:t>user creates a place in Foursquare, then checks in. If a server sees the check-in, they also saw the place creation event before.</a:t>
+              <a:t> user creates a place in Foursquare, then checks in. If a server sees the check-in, they also saw the place creation event before.</a:t>
             </a:r>
             <a:endParaRPr lang="hu-HU" dirty="0">
               <a:solidFill>
@@ -7180,7 +7177,6 @@
               <a:rPr lang="hu-HU" dirty="0"/>
               <a:t>4 – Monotonic Writes</a:t>
             </a:r>
-            <a:endParaRPr lang="hu-HU" dirty="0"/>
           </a:p>
         </p:txBody>
       </p:sp>
@@ -7872,11 +7868,7 @@
             </a:r>
             <a:r>
               <a:rPr lang="hu-HU" dirty="0" smtClean="0"/>
-              <a:t>utomatic </a:t>
-            </a:r>
-            <a:r>
-              <a:rPr lang="hu-HU" dirty="0" smtClean="0"/>
-              <a:t>address book backup service – shouldn’t overwrite/remove previous addresses</a:t>
+              <a:t>utomatic address book backup service – shouldn’t overwrite/remove previous addresses</a:t>
             </a:r>
           </a:p>
           <a:p>

</xml_diff>

<commit_message>
Filled the TODOs, diagram corretions
I filled the TODO bookmarks that I've seen. Also changed the arrow
directions with the common representation of notation of time for
computer science(arrow extends either right or down). Added existing
systems slide, I don't think I can add any more for the subtopic.
</commit_message>
<xml_diff>
--- a/presentation/slides_daniel.pptx
+++ b/presentation/slides_daniel.pptx
@@ -5321,10 +5321,10 @@
         </p:nvGrpSpPr>
         <p:grpSpPr>
           <a:xfrm>
-            <a:off x="251520" y="922015"/>
-            <a:ext cx="8640960" cy="5819353"/>
+            <a:off x="251520" y="908720"/>
+            <a:ext cx="7576899" cy="5819353"/>
             <a:chOff x="251520" y="922015"/>
-            <a:chExt cx="8640960" cy="5819353"/>
+            <a:chExt cx="7576899" cy="5819353"/>
           </a:xfrm>
         </p:grpSpPr>
         <p:sp>
@@ -5364,7 +5364,7 @@
             <p:nvPr/>
           </p:nvSpPr>
           <p:spPr>
-            <a:xfrm rot="16200000">
+            <a:xfrm rot="5400000">
               <a:off x="-1613030" y="3940714"/>
               <a:ext cx="5266928" cy="334380"/>
             </a:xfrm>
@@ -5421,7 +5421,7 @@
             <a:p>
               <a:r>
                 <a:rPr lang="en-US" sz="2800" dirty="0" smtClean="0"/>
-                <a:t>t1</a:t>
+                <a:t>t5</a:t>
               </a:r>
               <a:endParaRPr lang="en-US" sz="2800" dirty="0"/>
             </a:p>
@@ -5435,10 +5435,10 @@
           </p:nvGrpSpPr>
           <p:grpSpPr>
             <a:xfrm>
-              <a:off x="1187624" y="6021288"/>
-              <a:ext cx="3544814" cy="443191"/>
-              <a:chOff x="1187624" y="6021288"/>
-              <a:chExt cx="3544814" cy="443191"/>
+              <a:off x="1187624" y="2114440"/>
+              <a:ext cx="6640795" cy="4113704"/>
+              <a:chOff x="1187624" y="2114440"/>
+              <a:chExt cx="6640795" cy="4113704"/>
             </a:xfrm>
           </p:grpSpPr>
           <p:cxnSp>
@@ -5482,8 +5482,8 @@
             </p:nvSpPr>
             <p:spPr>
               <a:xfrm>
-                <a:off x="2049363" y="6021288"/>
-                <a:ext cx="2683075" cy="443191"/>
+                <a:off x="4101227" y="2114440"/>
+                <a:ext cx="3727192" cy="443191"/>
               </a:xfrm>
               <a:prstGeom prst="roundRect">
                 <a:avLst/>
@@ -5565,8 +5565,8 @@
           </p:nvSpPr>
           <p:spPr>
             <a:xfrm>
-              <a:off x="2743663" y="5085184"/>
-              <a:ext cx="2683075" cy="443191"/>
+              <a:off x="4101227" y="3093284"/>
+              <a:ext cx="3727192" cy="443191"/>
             </a:xfrm>
             <a:prstGeom prst="roundRect">
               <a:avLst/>
@@ -5630,7 +5630,7 @@
             <a:p>
               <a:r>
                 <a:rPr lang="en-US" sz="2800" dirty="0" smtClean="0"/>
-                <a:t>t2</a:t>
+                <a:t>t4</a:t>
               </a:r>
               <a:endParaRPr lang="en-US" sz="2800" dirty="0"/>
             </a:p>
@@ -5644,8 +5644,8 @@
           </p:nvCxnSpPr>
           <p:spPr>
             <a:xfrm flipH="1">
-              <a:off x="1229707" y="4398001"/>
-              <a:ext cx="2185258" cy="35788"/>
+              <a:off x="1229707" y="4429312"/>
+              <a:ext cx="2406189" cy="4477"/>
             </a:xfrm>
             <a:prstGeom prst="straightConnector1">
               <a:avLst/>
@@ -5677,8 +5677,8 @@
           </p:nvSpPr>
           <p:spPr>
             <a:xfrm>
-              <a:off x="3617117" y="4149080"/>
-              <a:ext cx="3331147" cy="443191"/>
+              <a:off x="4101227" y="4209945"/>
+              <a:ext cx="3727192" cy="443191"/>
             </a:xfrm>
             <a:prstGeom prst="roundRect">
               <a:avLst/>
@@ -5789,8 +5789,8 @@
           </p:nvSpPr>
           <p:spPr>
             <a:xfrm>
-              <a:off x="4121173" y="3068960"/>
-              <a:ext cx="2683075" cy="443191"/>
+              <a:off x="3059832" y="5148296"/>
+              <a:ext cx="4768587" cy="443191"/>
             </a:xfrm>
             <a:prstGeom prst="roundRect">
               <a:avLst/>
@@ -5824,15 +5824,7 @@
               <a:pPr algn="ctr"/>
               <a:r>
                 <a:rPr lang="en-US" sz="2800" dirty="0" smtClean="0"/>
-                <a:t>Write by C </a:t>
-              </a:r>
-              <a:r>
-                <a:rPr lang="en-US" sz="2800" smtClean="0"/>
-                <a:t>: </a:t>
-              </a:r>
-              <a:r>
-                <a:rPr lang="en-US" sz="2800" smtClean="0"/>
-                <a:t>W3</a:t>
+                <a:t>Write by C : W3</a:t>
               </a:r>
               <a:endParaRPr lang="en-US" sz="2800" dirty="0"/>
             </a:p>
@@ -5846,8 +5838,8 @@
           </p:nvCxnSpPr>
           <p:spPr>
             <a:xfrm flipH="1">
-              <a:off x="1234615" y="2290863"/>
-              <a:ext cx="3497823" cy="21797"/>
+              <a:off x="1276710" y="2303486"/>
+              <a:ext cx="2545676" cy="0"/>
             </a:xfrm>
             <a:prstGeom prst="straightConnector1">
               <a:avLst/>
@@ -5879,8 +5871,8 @@
           </p:nvSpPr>
           <p:spPr>
             <a:xfrm>
-              <a:off x="4985269" y="1988840"/>
-              <a:ext cx="3907211" cy="443191"/>
+              <a:off x="3057112" y="5832099"/>
+              <a:ext cx="4771307" cy="792088"/>
             </a:xfrm>
             <a:prstGeom prst="roundRect">
               <a:avLst/>
@@ -5914,7 +5906,26 @@
               <a:pPr algn="ctr"/>
               <a:r>
                 <a:rPr lang="en-US" sz="2400" dirty="0" smtClean="0"/>
-                <a:t>Read by A : R2 ={W1,W2,W3}</a:t>
+                <a:t>Read by </a:t>
+              </a:r>
+              <a:r>
+                <a:rPr lang="en-US" sz="2400" dirty="0" smtClean="0"/>
+                <a:t>A  must be :</a:t>
+              </a:r>
+            </a:p>
+            <a:p>
+              <a:pPr algn="ctr"/>
+              <a:r>
+                <a:rPr lang="en-US" sz="2400" dirty="0" smtClean="0"/>
+                <a:t> </a:t>
+              </a:r>
+              <a:r>
+                <a:rPr lang="en-US" sz="2400" dirty="0" smtClean="0"/>
+                <a:t>R2 ={W1,W2</a:t>
+              </a:r>
+              <a:r>
+                <a:rPr lang="en-US" sz="2400" dirty="0" smtClean="0"/>
+                <a:t>,[W3]}</a:t>
               </a:r>
               <a:endParaRPr lang="en-US" sz="2400" dirty="0"/>
             </a:p>
@@ -5944,7 +5955,7 @@
             <a:p>
               <a:r>
                 <a:rPr lang="en-US" sz="2800" dirty="0" smtClean="0"/>
-                <a:t>t4</a:t>
+                <a:t>t2</a:t>
               </a:r>
               <a:endParaRPr lang="en-US" sz="2800" dirty="0"/>
             </a:p>
@@ -5974,7 +5985,7 @@
             <a:p>
               <a:r>
                 <a:rPr lang="en-US" sz="2800" dirty="0" smtClean="0"/>
-                <a:t>t5</a:t>
+                <a:t>t1</a:t>
               </a:r>
               <a:endParaRPr lang="en-US" sz="2800" dirty="0"/>
             </a:p>
@@ -6281,7 +6292,7 @@
         </p:nvGrpSpPr>
         <p:grpSpPr>
           <a:xfrm>
-            <a:off x="5419674" y="1412776"/>
+            <a:off x="5436096" y="4725915"/>
             <a:ext cx="3544814" cy="1779888"/>
             <a:chOff x="1187624" y="6021288"/>
             <a:chExt cx="3544814" cy="443191"/>
@@ -6442,7 +6453,7 @@
               <p:nvPr/>
             </p:nvSpPr>
             <p:spPr>
-              <a:xfrm rot="16200000">
+              <a:xfrm rot="5400000">
                 <a:off x="-1613030" y="3940714"/>
                 <a:ext cx="5266928" cy="334380"/>
               </a:xfrm>
@@ -6527,7 +6538,7 @@
               <p:nvPr/>
             </p:nvSpPr>
             <p:spPr>
-              <a:xfrm rot="16200000">
+              <a:xfrm rot="5400000">
                 <a:off x="-1613030" y="3940714"/>
                 <a:ext cx="5266928" cy="334380"/>
               </a:xfrm>
@@ -6570,9 +6581,9 @@
         </p:nvGrpSpPr>
         <p:grpSpPr>
           <a:xfrm flipH="1">
-            <a:off x="107504" y="5794121"/>
+            <a:off x="114689" y="1502671"/>
             <a:ext cx="3525036" cy="443191"/>
-            <a:chOff x="1187624" y="6021288"/>
+            <a:chOff x="1137425" y="4101752"/>
             <a:chExt cx="3544814" cy="443191"/>
           </a:xfrm>
         </p:grpSpPr>
@@ -6584,7 +6595,7 @@
           </p:nvCxnSpPr>
           <p:spPr>
             <a:xfrm flipH="1">
-              <a:off x="1187624" y="6228143"/>
+              <a:off x="1137425" y="4308607"/>
               <a:ext cx="751793" cy="1"/>
             </a:xfrm>
             <a:prstGeom prst="straightConnector1">
@@ -6617,7 +6628,7 @@
           </p:nvSpPr>
           <p:spPr>
             <a:xfrm>
-              <a:off x="2049363" y="6021288"/>
+              <a:off x="1999164" y="4101752"/>
               <a:ext cx="2683075" cy="443191"/>
             </a:xfrm>
             <a:prstGeom prst="roundRect">
@@ -6667,10 +6678,10 @@
         </p:nvGrpSpPr>
         <p:grpSpPr>
           <a:xfrm flipH="1">
-            <a:off x="107504" y="4714001"/>
-            <a:ext cx="3525036" cy="443191"/>
-            <a:chOff x="1187624" y="6021288"/>
-            <a:chExt cx="3544814" cy="443191"/>
+            <a:off x="114686" y="2342087"/>
+            <a:ext cx="3454083" cy="443191"/>
+            <a:chOff x="1208779" y="6021288"/>
+            <a:chExt cx="3473463" cy="443191"/>
           </a:xfrm>
         </p:grpSpPr>
         <p:cxnSp>
@@ -6680,9 +6691,9 @@
             <p:nvPr/>
           </p:nvCxnSpPr>
           <p:spPr>
-            <a:xfrm flipH="1">
-              <a:off x="1187624" y="6228143"/>
-              <a:ext cx="751793" cy="1"/>
+            <a:xfrm flipH="1" flipV="1">
+              <a:off x="1208779" y="6240941"/>
+              <a:ext cx="668245" cy="3165"/>
             </a:xfrm>
             <a:prstGeom prst="straightConnector1">
               <a:avLst/>
@@ -6714,8 +6725,8 @@
           </p:nvSpPr>
           <p:spPr>
             <a:xfrm>
-              <a:off x="2049363" y="6021288"/>
-              <a:ext cx="2683075" cy="443191"/>
+              <a:off x="1987588" y="6021288"/>
+              <a:ext cx="2694654" cy="443191"/>
             </a:xfrm>
             <a:prstGeom prst="roundRect">
               <a:avLst/>
@@ -6764,10 +6775,10 @@
         </p:nvGrpSpPr>
         <p:grpSpPr>
           <a:xfrm flipH="1">
-            <a:off x="107504" y="3633881"/>
-            <a:ext cx="3525036" cy="443191"/>
-            <a:chOff x="1187624" y="6021288"/>
-            <a:chExt cx="3544814" cy="443191"/>
+            <a:off x="114687" y="3181503"/>
+            <a:ext cx="3492523" cy="443191"/>
+            <a:chOff x="1170122" y="7940824"/>
+            <a:chExt cx="3512118" cy="443191"/>
           </a:xfrm>
         </p:grpSpPr>
         <p:cxnSp>
@@ -6778,7 +6789,7 @@
           </p:nvCxnSpPr>
           <p:spPr>
             <a:xfrm flipH="1">
-              <a:off x="1187624" y="6228143"/>
+              <a:off x="1170122" y="8130996"/>
               <a:ext cx="751793" cy="1"/>
             </a:xfrm>
             <a:prstGeom prst="straightConnector1">
@@ -6811,8 +6822,8 @@
           </p:nvSpPr>
           <p:spPr>
             <a:xfrm>
-              <a:off x="2049363" y="6021288"/>
-              <a:ext cx="2683075" cy="443191"/>
+              <a:off x="1999164" y="7940824"/>
+              <a:ext cx="2683076" cy="443191"/>
             </a:xfrm>
             <a:prstGeom prst="roundRect">
               <a:avLst/>
@@ -7188,9 +7199,9 @@
         </p:nvGrpSpPr>
         <p:grpSpPr>
           <a:xfrm>
-            <a:off x="5419674" y="1412776"/>
+            <a:off x="5443341" y="4693471"/>
             <a:ext cx="3544814" cy="1779888"/>
-            <a:chOff x="1187624" y="6021288"/>
+            <a:chOff x="1211291" y="6838179"/>
             <a:chExt cx="3544814" cy="443191"/>
           </a:xfrm>
         </p:grpSpPr>
@@ -7202,7 +7213,7 @@
           </p:nvCxnSpPr>
           <p:spPr>
             <a:xfrm flipH="1">
-              <a:off x="1187624" y="6228143"/>
+              <a:off x="1211291" y="7045034"/>
               <a:ext cx="751793" cy="1"/>
             </a:xfrm>
             <a:prstGeom prst="straightConnector1">
@@ -7235,7 +7246,7 @@
           </p:nvSpPr>
           <p:spPr>
             <a:xfrm>
-              <a:off x="2049363" y="6021288"/>
+              <a:off x="2073030" y="6838179"/>
               <a:ext cx="2683075" cy="443191"/>
             </a:xfrm>
             <a:prstGeom prst="roundRect">
@@ -7349,7 +7360,7 @@
               <p:nvPr/>
             </p:nvSpPr>
             <p:spPr>
-              <a:xfrm rot="16200000">
+              <a:xfrm rot="5400000">
                 <a:off x="-1613030" y="3940714"/>
                 <a:ext cx="5266928" cy="334380"/>
               </a:xfrm>
@@ -7434,7 +7445,7 @@
               <p:nvPr/>
             </p:nvSpPr>
             <p:spPr>
-              <a:xfrm rot="16200000">
+              <a:xfrm rot="5400000">
                 <a:off x="-1613030" y="3940714"/>
                 <a:ext cx="5266928" cy="334380"/>
               </a:xfrm>
@@ -7477,7 +7488,7 @@
         </p:nvGrpSpPr>
         <p:grpSpPr>
           <a:xfrm flipH="1">
-            <a:off x="107504" y="5517232"/>
+            <a:off x="18656" y="1859529"/>
             <a:ext cx="3525036" cy="443191"/>
             <a:chOff x="1187624" y="6021288"/>
             <a:chExt cx="3544814" cy="443191"/>
@@ -10432,13 +10443,38 @@
           <a:lstStyle/>
           <a:p>
             <a:r>
-              <a:rPr lang="hu-HU" b="1" dirty="0" smtClean="0"/>
+              <a:rPr lang="en-US" dirty="0" smtClean="0"/>
+              <a:t>Trivial for any system that has version vectors (</a:t>
+            </a:r>
+            <a:r>
+              <a:rPr lang="hu-HU" dirty="0" smtClean="0"/>
               <a:t>Coda</a:t>
             </a:r>
             <a:r>
               <a:rPr lang="hu-HU" dirty="0" smtClean="0"/>
-              <a:t>, Ficus, refdbms</a:t>
-            </a:r>
+              <a:t>, Ficus, </a:t>
+            </a:r>
+            <a:r>
+              <a:rPr lang="hu-HU" dirty="0" smtClean="0"/>
+              <a:t>refdbms</a:t>
+            </a:r>
+            <a:r>
+              <a:rPr lang="en-US" dirty="0" smtClean="0"/>
+              <a:t>)</a:t>
+            </a:r>
+          </a:p>
+          <a:p>
+            <a:r>
+              <a:rPr lang="en-US" dirty="0" smtClean="0"/>
+              <a:t>Incremental and/or Selective Deployment</a:t>
+            </a:r>
+          </a:p>
+          <a:p>
+            <a:r>
+              <a:rPr lang="en-US" dirty="0" smtClean="0"/>
+              <a:t>Sorry!: The article doesn’t mention about evaluation any more</a:t>
+            </a:r>
+            <a:endParaRPr lang="hu-HU" dirty="0" smtClean="0"/>
           </a:p>
           <a:p>
             <a:endParaRPr lang="hu-HU" dirty="0"/>
@@ -10897,29 +10933,53 @@
           <a:p>
             <a:pPr lvl="1"/>
             <a:r>
-              <a:rPr lang="hu-HU" dirty="0" smtClean="0"/>
-              <a:t>TODO</a:t>
-            </a:r>
-          </a:p>
-          <a:p>
-            <a:r>
-              <a:rPr lang="hu-HU" dirty="0" smtClean="0"/>
-              <a:t>Disconnected operations</a:t>
-            </a:r>
+              <a:rPr lang="en-US" dirty="0" smtClean="0"/>
+              <a:t>Why separating server duties is no good?</a:t>
+            </a:r>
+            <a:endParaRPr lang="hu-HU" dirty="0" smtClean="0"/>
+          </a:p>
+          <a:p>
+            <a:r>
+              <a:rPr lang="en-US" dirty="0" smtClean="0"/>
+              <a:t>How can we handle </a:t>
+            </a:r>
+            <a:r>
+              <a:rPr lang="en-US" dirty="0"/>
+              <a:t>d</a:t>
+            </a:r>
+            <a:r>
+              <a:rPr lang="hu-HU" dirty="0" smtClean="0"/>
+              <a:t>isconnected operations</a:t>
+            </a:r>
+            <a:r>
+              <a:rPr lang="en-US" dirty="0" smtClean="0"/>
+              <a:t>?</a:t>
+            </a:r>
+            <a:endParaRPr lang="hu-HU" dirty="0" smtClean="0"/>
           </a:p>
           <a:p>
             <a:pPr lvl="1"/>
             <a:r>
               <a:rPr lang="hu-HU" dirty="0" smtClean="0"/>
-              <a:t>Closed, synchronized copies are unavailable</a:t>
-            </a:r>
+              <a:t>Closed, synchronized copies are </a:t>
+            </a:r>
+            <a:r>
+              <a:rPr lang="hu-HU" dirty="0" smtClean="0"/>
+              <a:t>unavailable</a:t>
+            </a:r>
+            <a:endParaRPr lang="en-US" dirty="0" smtClean="0"/>
           </a:p>
           <a:p>
             <a:pPr lvl="1"/>
             <a:r>
-              <a:rPr lang="hu-HU" dirty="0" smtClean="0"/>
-              <a:t>TODO</a:t>
-            </a:r>
+              <a:rPr lang="en-US" dirty="0" smtClean="0"/>
+              <a:t>Can I disconnect in time?</a:t>
+            </a:r>
+            <a:endParaRPr lang="hu-HU" dirty="0" smtClean="0"/>
+          </a:p>
+          <a:p>
+            <a:pPr lvl="1"/>
+            <a:endParaRPr lang="hu-HU" dirty="0" smtClean="0"/>
           </a:p>
           <a:p>
             <a:endParaRPr lang="hu-HU" dirty="0"/>
@@ -11002,22 +11062,37 @@
           <a:lstStyle/>
           <a:p>
             <a:r>
-              <a:rPr lang="hu-HU" dirty="0" smtClean="0"/>
-              <a:t>TODO: example</a:t>
+              <a:rPr lang="en-US" dirty="0" smtClean="0"/>
+              <a:t>Imagine your daily mobile device usage</a:t>
+            </a:r>
+          </a:p>
+          <a:p>
+            <a:pPr lvl="1"/>
+            <a:r>
+              <a:rPr lang="en-US" dirty="0" smtClean="0"/>
+              <a:t>You don’t live in an eventually consistent world</a:t>
             </a:r>
           </a:p>
           <a:p>
             <a:r>
               <a:rPr lang="hu-HU" b="1" dirty="0" smtClean="0"/>
-              <a:t>Eventual consistency is not always enough for the user</a:t>
-            </a:r>
-          </a:p>
-          <a:p>
-            <a:r>
-              <a:rPr lang="hu-HU" dirty="0" smtClean="0"/>
-              <a:t>A solution can be added as a layer to existing systems</a:t>
-            </a:r>
-            <a:endParaRPr lang="hu-HU" dirty="0"/>
+              <a:t>Eventual </a:t>
+            </a:r>
+            <a:r>
+              <a:rPr lang="hu-HU" b="1" dirty="0" smtClean="0"/>
+              <a:t>consistency is not always enough for the user</a:t>
+            </a:r>
+          </a:p>
+          <a:p>
+            <a:r>
+              <a:rPr lang="en-US" dirty="0" smtClean="0"/>
+              <a:t>So now, will we present a solution which requires to redevelop everything?</a:t>
+            </a:r>
+            <a:endParaRPr lang="en-US" dirty="0"/>
+          </a:p>
+          <a:p>
+            <a:pPr lvl="1"/>
+            <a:endParaRPr lang="en-US" dirty="0" smtClean="0"/>
           </a:p>
         </p:txBody>
       </p:sp>
@@ -11075,7 +11150,15 @@
           <a:p>
             <a:r>
               <a:rPr lang="hu-HU" dirty="0" smtClean="0"/>
-              <a:t>Solution: Guarantees</a:t>
+              <a:t>Solution: </a:t>
+            </a:r>
+            <a:r>
+              <a:rPr lang="en-US" dirty="0" smtClean="0"/>
+              <a:t>Session </a:t>
+            </a:r>
+            <a:r>
+              <a:rPr lang="hu-HU" dirty="0" smtClean="0"/>
+              <a:t>Guarantees</a:t>
             </a:r>
             <a:endParaRPr lang="hu-HU" dirty="0"/>
           </a:p>

</xml_diff>

<commit_message>
Added a questions slide
</commit_message>
<xml_diff>
--- a/presentation/slides_daniel.pptx
+++ b/presentation/slides_daniel.pptx
@@ -5,7 +5,7 @@
     <p:sldMasterId id="2147483648" r:id="rId1"/>
   </p:sldMasterIdLst>
   <p:notesMasterIdLst>
-    <p:notesMasterId r:id="rId31"/>
+    <p:notesMasterId r:id="rId33"/>
   </p:notesMasterIdLst>
   <p:sldIdLst>
     <p:sldId id="256" r:id="rId2"/>
@@ -37,6 +37,8 @@
     <p:sldId id="281" r:id="rId28"/>
     <p:sldId id="282" r:id="rId29"/>
     <p:sldId id="286" r:id="rId30"/>
+    <p:sldId id="287" r:id="rId31"/>
+    <p:sldId id="288" r:id="rId32"/>
   </p:sldIdLst>
   <p:sldSz cx="9144000" cy="6858000" type="screen4x3"/>
   <p:notesSz cx="6858000" cy="9144000"/>
@@ -137,7 +139,7 @@
   </p:defaultTextStyle>
   <p:extLst>
     <p:ext uri="{EFAFB233-063F-42B5-8137-9DF3F51BA10A}">
-      <p15:sldGuideLst xmlns:p15="http://schemas.microsoft.com/office/powerpoint/2012/main">
+      <p15:sldGuideLst xmlns="" xmlns:p15="http://schemas.microsoft.com/office/powerpoint/2012/main">
         <p15:guide id="1" orient="horz" pos="2160">
           <p15:clr>
             <a:srgbClr val="A4A3A4"/>
@@ -1274,15 +1276,19 @@
           <a:p>
             <a:r>
               <a:rPr lang="en-US" dirty="0" smtClean="0"/>
-              <a:t>Strict=that the </a:t>
-            </a:r>
-            <a:r>
-              <a:rPr lang="en-US" dirty="0" err="1" smtClean="0"/>
-              <a:t>mostrecent</a:t>
+              <a:t>Strict=that the most</a:t>
+            </a:r>
+            <a:r>
+              <a:rPr lang="hu-HU" smtClean="0"/>
+              <a:t> </a:t>
+            </a:r>
+            <a:r>
+              <a:rPr lang="en-US" smtClean="0"/>
+              <a:t>recent </a:t>
             </a:r>
             <a:r>
               <a:rPr lang="en-US" dirty="0" smtClean="0"/>
-              <a:t> version of a file existing in the system is returned.</a:t>
+              <a:t>version of a file existing in the system is returned.</a:t>
             </a:r>
           </a:p>
           <a:p>
@@ -5906,26 +5912,14 @@
               <a:pPr algn="ctr"/>
               <a:r>
                 <a:rPr lang="en-US" sz="2400" dirty="0" smtClean="0"/>
-                <a:t>Read by </a:t>
-              </a:r>
-              <a:r>
-                <a:rPr lang="en-US" sz="2400" dirty="0" smtClean="0"/>
-                <a:t>A  must be :</a:t>
+                <a:t>Read by A  must be :</a:t>
               </a:r>
             </a:p>
             <a:p>
               <a:pPr algn="ctr"/>
               <a:r>
                 <a:rPr lang="en-US" sz="2400" dirty="0" smtClean="0"/>
-                <a:t> </a:t>
-              </a:r>
-              <a:r>
-                <a:rPr lang="en-US" sz="2400" dirty="0" smtClean="0"/>
-                <a:t>R2 ={W1,W2</a:t>
-              </a:r>
-              <a:r>
-                <a:rPr lang="en-US" sz="2400" dirty="0" smtClean="0"/>
-                <a:t>,[W3]}</a:t>
+                <a:t> R2 ={W1,W2,[W3]}</a:t>
               </a:r>
               <a:endParaRPr lang="en-US" sz="2400" dirty="0"/>
             </a:p>
@@ -8134,7 +8128,7 @@
                       <m:sSubPr>
                         <m:ctrlPr>
                           <a:rPr lang="hu-HU" b="0" i="1" smtClean="0">
-                            <a:latin typeface="Cambria Math" panose="02040503050406030204" pitchFamily="18" charset="0"/>
+                            <a:latin typeface="Cambria Math"/>
                             <a:ea typeface="Cambria Math"/>
                           </a:rPr>
                         </m:ctrlPr>
@@ -8203,7 +8197,7 @@
                       <m:dPr>
                         <m:ctrlPr>
                           <a:rPr lang="hu-HU" b="0" i="1" smtClean="0">
-                            <a:latin typeface="Cambria Math" panose="02040503050406030204" pitchFamily="18" charset="0"/>
+                            <a:latin typeface="Cambria Math"/>
                             <a:ea typeface="Cambria Math"/>
                           </a:rPr>
                         </m:ctrlPr>
@@ -8531,7 +8525,7 @@
                       <m:dPr>
                         <m:ctrlPr>
                           <a:rPr lang="hu-HU" b="0" i="1" smtClean="0">
-                            <a:latin typeface="Cambria Math" panose="02040503050406030204" pitchFamily="18" charset="0"/>
+                            <a:latin typeface="Cambria Math"/>
                           </a:rPr>
                         </m:ctrlPr>
                       </m:dPr>
@@ -8815,7 +8809,7 @@
                       <m:dPr>
                         <m:ctrlPr>
                           <a:rPr lang="hu-HU" b="0" i="1" smtClean="0">
-                            <a:latin typeface="Cambria Math" panose="02040503050406030204" pitchFamily="18" charset="0"/>
+                            <a:latin typeface="Cambria Math"/>
                           </a:rPr>
                         </m:ctrlPr>
                       </m:dPr>
@@ -8824,7 +8818,7 @@
                           <m:sSubPr>
                             <m:ctrlPr>
                               <a:rPr lang="hu-HU" b="0" i="1" smtClean="0">
-                                <a:latin typeface="Cambria Math" panose="02040503050406030204" pitchFamily="18" charset="0"/>
+                                <a:latin typeface="Cambria Math"/>
                               </a:rPr>
                             </m:ctrlPr>
                           </m:sSubPr>
@@ -8855,7 +8849,7 @@
                           <m:sSubPr>
                             <m:ctrlPr>
                               <a:rPr lang="hu-HU" b="0" i="1" smtClean="0">
-                                <a:latin typeface="Cambria Math" panose="02040503050406030204" pitchFamily="18" charset="0"/>
+                                <a:latin typeface="Cambria Math"/>
                               </a:rPr>
                             </m:ctrlPr>
                           </m:sSubPr>
@@ -8912,7 +8906,7 @@
                       <m:sSubPr>
                         <m:ctrlPr>
                           <a:rPr lang="hu-HU" b="0" i="1" smtClean="0">
-                            <a:latin typeface="Cambria Math" panose="02040503050406030204" pitchFamily="18" charset="0"/>
+                            <a:latin typeface="Cambria Math"/>
                           </a:rPr>
                         </m:ctrlPr>
                       </m:sSubPr>
@@ -9038,7 +9032,7 @@
                       <m:sSubPr>
                         <m:ctrlPr>
                           <a:rPr lang="hu-HU" i="1" smtClean="0">
-                            <a:latin typeface="Cambria Math" panose="02040503050406030204" pitchFamily="18" charset="0"/>
+                            <a:latin typeface="Cambria Math"/>
                             <a:ea typeface="Cambria Math"/>
                           </a:rPr>
                         </m:ctrlPr>
@@ -9080,7 +9074,7 @@
                       <m:dPr>
                         <m:ctrlPr>
                           <a:rPr lang="hu-HU" b="0" i="1" smtClean="0">
-                            <a:latin typeface="Cambria Math" panose="02040503050406030204" pitchFamily="18" charset="0"/>
+                            <a:latin typeface="Cambria Math"/>
                             <a:ea typeface="Cambria Math"/>
                           </a:rPr>
                         </m:ctrlPr>
@@ -9155,7 +9149,7 @@
                       <m:dPr>
                         <m:ctrlPr>
                           <a:rPr lang="hu-HU" b="0" i="1" smtClean="0">
-                            <a:latin typeface="Cambria Math" panose="02040503050406030204" pitchFamily="18" charset="0"/>
+                            <a:latin typeface="Cambria Math"/>
                             <a:ea typeface="Cambria Math"/>
                           </a:rPr>
                         </m:ctrlPr>
@@ -9165,7 +9159,7 @@
                           <m:sSubPr>
                             <m:ctrlPr>
                               <a:rPr lang="hu-HU" b="0" i="1" smtClean="0">
-                                <a:latin typeface="Cambria Math" panose="02040503050406030204" pitchFamily="18" charset="0"/>
+                                <a:latin typeface="Cambria Math"/>
                                 <a:ea typeface="Cambria Math"/>
                               </a:rPr>
                             </m:ctrlPr>
@@ -9200,7 +9194,7 @@
                           <m:sSubPr>
                             <m:ctrlPr>
                               <a:rPr lang="hu-HU" b="0" i="1" smtClean="0">
-                                <a:latin typeface="Cambria Math" panose="02040503050406030204" pitchFamily="18" charset="0"/>
+                                <a:latin typeface="Cambria Math"/>
                                 <a:ea typeface="Cambria Math"/>
                               </a:rPr>
                             </m:ctrlPr>
@@ -9237,7 +9231,7 @@
                       <m:sSubPr>
                         <m:ctrlPr>
                           <a:rPr lang="hu-HU" b="0" i="1" smtClean="0">
-                            <a:latin typeface="Cambria Math" panose="02040503050406030204" pitchFamily="18" charset="0"/>
+                            <a:latin typeface="Cambria Math"/>
                             <a:ea typeface="Cambria Math"/>
                           </a:rPr>
                         </m:ctrlPr>
@@ -9725,7 +9719,7 @@
                       <m:dPr>
                         <m:ctrlPr>
                           <a:rPr lang="hu-HU" b="0" i="1" smtClean="0">
-                            <a:latin typeface="Cambria Math" panose="02040503050406030204" pitchFamily="18" charset="0"/>
+                            <a:latin typeface="Cambria Math"/>
                           </a:rPr>
                         </m:ctrlPr>
                       </m:dPr>
@@ -9795,7 +9789,7 @@
                         <m:endChr m:val="}"/>
                         <m:ctrlPr>
                           <a:rPr lang="hu-HU" b="0" i="1" smtClean="0">
-                            <a:latin typeface="Cambria Math" panose="02040503050406030204" pitchFamily="18" charset="0"/>
+                            <a:latin typeface="Cambria Math"/>
                             <a:ea typeface="Cambria Math"/>
                           </a:rPr>
                         </m:ctrlPr>
@@ -9805,7 +9799,7 @@
                           <m:sSubPr>
                             <m:ctrlPr>
                               <a:rPr lang="hu-HU" b="0" i="1" smtClean="0">
-                                <a:latin typeface="Cambria Math" panose="02040503050406030204" pitchFamily="18" charset="0"/>
+                                <a:latin typeface="Cambria Math"/>
                                 <a:ea typeface="Cambria Math"/>
                               </a:rPr>
                             </m:ctrlPr>
@@ -10218,20 +10212,57 @@
             </a:r>
             <a:r>
               <a:rPr lang="hu-HU" dirty="0" smtClean="0"/>
-              <a:t> of WID sets Ws1 and Ws2</a:t>
-            </a:r>
+              <a:t> of WID sets Ws</a:t>
+            </a:r>
+            <a:r>
+              <a:rPr lang="hu-HU" sz="2000" dirty="0" smtClean="0"/>
+              <a:t>1</a:t>
+            </a:r>
+            <a:r>
+              <a:rPr lang="hu-HU" dirty="0" smtClean="0"/>
+              <a:t> and Ws</a:t>
+            </a:r>
+            <a:r>
+              <a:rPr lang="hu-HU" sz="2000" dirty="0" smtClean="0"/>
+              <a:t>2</a:t>
+            </a:r>
+            <a:endParaRPr lang="hu-HU" dirty="0" smtClean="0"/>
           </a:p>
           <a:p>
             <a:pPr lvl="1"/>
             <a:r>
               <a:rPr lang="hu-HU" dirty="0" smtClean="0"/>
-              <a:t>V[S] = MAX(V1[S], V2[S]) for all S</a:t>
-            </a:r>
-          </a:p>
-          <a:p>
-            <a:r>
-              <a:rPr lang="hu-HU" dirty="0" smtClean="0"/>
-              <a:t>Check if Ws1 is a </a:t>
+              <a:t>V[S] = MAX(V</a:t>
+            </a:r>
+            <a:r>
+              <a:rPr lang="hu-HU" sz="1800" dirty="0" smtClean="0"/>
+              <a:t>1</a:t>
+            </a:r>
+            <a:r>
+              <a:rPr lang="hu-HU" dirty="0" smtClean="0"/>
+              <a:t>[S], V</a:t>
+            </a:r>
+            <a:r>
+              <a:rPr lang="hu-HU" sz="1800" dirty="0" smtClean="0"/>
+              <a:t>2</a:t>
+            </a:r>
+            <a:r>
+              <a:rPr lang="hu-HU" dirty="0" smtClean="0"/>
+              <a:t>[S]) for all S</a:t>
+            </a:r>
+          </a:p>
+          <a:p>
+            <a:r>
+              <a:rPr lang="hu-HU" dirty="0" smtClean="0"/>
+              <a:t>Check if Ws</a:t>
+            </a:r>
+            <a:r>
+              <a:rPr lang="hu-HU" sz="2000" dirty="0" smtClean="0"/>
+              <a:t>1</a:t>
+            </a:r>
+            <a:r>
+              <a:rPr lang="hu-HU" dirty="0" smtClean="0"/>
+              <a:t> is a </a:t>
             </a:r>
             <a:r>
               <a:rPr lang="hu-HU" b="1" dirty="0" smtClean="0"/>
@@ -10239,14 +10270,35 @@
             </a:r>
             <a:r>
               <a:rPr lang="hu-HU" dirty="0" smtClean="0"/>
-              <a:t> of Ws2</a:t>
-            </a:r>
+              <a:t> of Ws</a:t>
+            </a:r>
+            <a:r>
+              <a:rPr lang="hu-HU" sz="2000" dirty="0" smtClean="0"/>
+              <a:t>2</a:t>
+            </a:r>
+            <a:endParaRPr lang="hu-HU" dirty="0" smtClean="0"/>
           </a:p>
           <a:p>
             <a:pPr lvl="1"/>
             <a:r>
               <a:rPr lang="hu-HU" dirty="0" smtClean="0"/>
-              <a:t>V2[S] &gt; V1[S] for all S</a:t>
+              <a:t>V</a:t>
+            </a:r>
+            <a:r>
+              <a:rPr lang="hu-HU" sz="1800" dirty="0" smtClean="0"/>
+              <a:t>2</a:t>
+            </a:r>
+            <a:r>
+              <a:rPr lang="hu-HU" dirty="0" smtClean="0"/>
+              <a:t>[S] &gt; V</a:t>
+            </a:r>
+            <a:r>
+              <a:rPr lang="hu-HU" sz="1800" dirty="0" smtClean="0"/>
+              <a:t>1</a:t>
+            </a:r>
+            <a:r>
+              <a:rPr lang="hu-HU" dirty="0" smtClean="0"/>
+              <a:t>[S] for all S</a:t>
             </a:r>
           </a:p>
           <a:p>
@@ -10353,7 +10405,7 @@
           <a:p>
             <a:r>
               <a:rPr lang="hu-HU" dirty="0" smtClean="0"/>
-              <a:t>Session Manager can cache Version Vectors of verious servers</a:t>
+              <a:t>Session Manager can cache Version Vectors of various servers</a:t>
             </a:r>
           </a:p>
           <a:p>
@@ -10448,15 +10500,7 @@
             </a:r>
             <a:r>
               <a:rPr lang="hu-HU" dirty="0" smtClean="0"/>
-              <a:t>Coda</a:t>
-            </a:r>
-            <a:r>
-              <a:rPr lang="hu-HU" dirty="0" smtClean="0"/>
-              <a:t>, Ficus, </a:t>
-            </a:r>
-            <a:r>
-              <a:rPr lang="hu-HU" dirty="0" smtClean="0"/>
-              <a:t>refdbms</a:t>
+              <a:t>Coda, Ficus, refdbms</a:t>
             </a:r>
             <a:r>
               <a:rPr lang="en-US" dirty="0" smtClean="0"/>
@@ -10659,12 +10703,16 @@
               <a:t>- Clients desiring consistency among multiple read and/or write operations must, in general, use the </a:t>
             </a:r>
             <a:r>
-              <a:rPr lang="en-US" sz="2400" dirty="0" err="1" smtClean="0"/>
-              <a:t>sameserver</a:t>
-            </a:r>
-            <a:r>
               <a:rPr lang="en-US" sz="2400" dirty="0" smtClean="0"/>
+              <a:t>same</a:t>
+            </a:r>
+            <a:r>
+              <a:rPr lang="hu-HU" sz="2400" dirty="0" smtClean="0"/>
               <a:t> </a:t>
+            </a:r>
+            <a:r>
+              <a:rPr lang="en-US" sz="2400" dirty="0" smtClean="0"/>
+              <a:t>server </a:t>
             </a:r>
             <a:r>
               <a:rPr lang="en-US" sz="2400" dirty="0"/>
@@ -10865,6 +10913,172 @@
 </p:sld>
 </file>
 
+<file path=ppt/slides/slide30.xml><?xml version="1.0" encoding="utf-8"?>
+<p:sld xmlns:a="http://schemas.openxmlformats.org/drawingml/2006/main" xmlns:r="http://schemas.openxmlformats.org/officeDocument/2006/relationships" xmlns:p="http://schemas.openxmlformats.org/presentationml/2006/main">
+  <p:cSld>
+    <p:spTree>
+      <p:nvGrpSpPr>
+        <p:cNvPr id="1" name=""/>
+        <p:cNvGrpSpPr/>
+        <p:nvPr/>
+      </p:nvGrpSpPr>
+      <p:grpSpPr>
+        <a:xfrm>
+          <a:off x="0" y="0"/>
+          <a:ext cx="0" cy="0"/>
+          <a:chOff x="0" y="0"/>
+          <a:chExt cx="0" cy="0"/>
+        </a:xfrm>
+      </p:grpSpPr>
+      <p:sp>
+        <p:nvSpPr>
+          <p:cNvPr id="2" name="Title 1"/>
+          <p:cNvSpPr>
+            <a:spLocks noGrp="1"/>
+          </p:cNvSpPr>
+          <p:nvPr>
+            <p:ph type="title"/>
+          </p:nvPr>
+        </p:nvSpPr>
+        <p:spPr/>
+        <p:txBody>
+          <a:bodyPr/>
+          <a:lstStyle/>
+          <a:p>
+            <a:r>
+              <a:rPr lang="hu-HU" dirty="0" smtClean="0"/>
+              <a:t>Conclusion</a:t>
+            </a:r>
+            <a:endParaRPr lang="hu-HU" dirty="0"/>
+          </a:p>
+        </p:txBody>
+      </p:sp>
+      <p:sp>
+        <p:nvSpPr>
+          <p:cNvPr id="3" name="Content Placeholder 2"/>
+          <p:cNvSpPr>
+            <a:spLocks noGrp="1"/>
+          </p:cNvSpPr>
+          <p:nvPr>
+            <p:ph idx="1"/>
+          </p:nvPr>
+        </p:nvSpPr>
+        <p:spPr/>
+        <p:txBody>
+          <a:bodyPr/>
+          <a:lstStyle/>
+          <a:p>
+            <a:r>
+              <a:rPr lang="hu-HU" dirty="0" smtClean="0"/>
+              <a:t>The paper does not present any evaluation</a:t>
+            </a:r>
+          </a:p>
+          <a:p>
+            <a:r>
+              <a:rPr lang="hu-HU" dirty="0" smtClean="0"/>
+              <a:t>Supposedly, it is straightforward to add guarantees to existing systems</a:t>
+            </a:r>
+          </a:p>
+          <a:p>
+            <a:r>
+              <a:rPr lang="hu-HU" dirty="0" smtClean="0"/>
+              <a:t>„Modular” in a sense, guarantees are independently grantable</a:t>
+            </a:r>
+          </a:p>
+          <a:p>
+            <a:r>
+              <a:rPr lang="hu-HU" dirty="0" smtClean="0"/>
+              <a:t>We can get the benefits of weakly consistent systems, with added guarantees, at a reasonable cost</a:t>
+            </a:r>
+            <a:endParaRPr lang="hu-HU" dirty="0"/>
+          </a:p>
+        </p:txBody>
+      </p:sp>
+    </p:spTree>
+    <p:extLst>
+      <p:ext uri="{BB962C8B-B14F-4D97-AF65-F5344CB8AC3E}">
+        <p14:creationId xmlns:p14="http://schemas.microsoft.com/office/powerpoint/2010/main" val="2742551865"/>
+      </p:ext>
+    </p:extLst>
+  </p:cSld>
+  <p:clrMapOvr>
+    <a:masterClrMapping/>
+  </p:clrMapOvr>
+</p:sld>
+</file>
+
+<file path=ppt/slides/slide31.xml><?xml version="1.0" encoding="utf-8"?>
+<p:sld xmlns:a="http://schemas.openxmlformats.org/drawingml/2006/main" xmlns:r="http://schemas.openxmlformats.org/officeDocument/2006/relationships" xmlns:p="http://schemas.openxmlformats.org/presentationml/2006/main">
+  <p:cSld>
+    <p:spTree>
+      <p:nvGrpSpPr>
+        <p:cNvPr id="1" name=""/>
+        <p:cNvGrpSpPr/>
+        <p:nvPr/>
+      </p:nvGrpSpPr>
+      <p:grpSpPr>
+        <a:xfrm>
+          <a:off x="0" y="0"/>
+          <a:ext cx="0" cy="0"/>
+          <a:chOff x="0" y="0"/>
+          <a:chExt cx="0" cy="0"/>
+        </a:xfrm>
+      </p:grpSpPr>
+      <p:sp>
+        <p:nvSpPr>
+          <p:cNvPr id="2" name="Title 1"/>
+          <p:cNvSpPr>
+            <a:spLocks noGrp="1"/>
+          </p:cNvSpPr>
+          <p:nvPr>
+            <p:ph type="title"/>
+          </p:nvPr>
+        </p:nvSpPr>
+        <p:spPr/>
+        <p:txBody>
+          <a:bodyPr/>
+          <a:lstStyle/>
+          <a:p>
+            <a:r>
+              <a:rPr lang="hu-HU" dirty="0" smtClean="0"/>
+              <a:t>Questions?</a:t>
+            </a:r>
+            <a:endParaRPr lang="hu-HU" dirty="0"/>
+          </a:p>
+        </p:txBody>
+      </p:sp>
+      <p:sp>
+        <p:nvSpPr>
+          <p:cNvPr id="4" name="Content Placeholder 3"/>
+          <p:cNvSpPr>
+            <a:spLocks noGrp="1"/>
+          </p:cNvSpPr>
+          <p:nvPr>
+            <p:ph idx="1"/>
+          </p:nvPr>
+        </p:nvSpPr>
+        <p:spPr/>
+        <p:txBody>
+          <a:bodyPr/>
+          <a:lstStyle/>
+          <a:p>
+            <a:endParaRPr lang="hu-HU" dirty="0"/>
+          </a:p>
+        </p:txBody>
+      </p:sp>
+    </p:spTree>
+    <p:extLst>
+      <p:ext uri="{BB962C8B-B14F-4D97-AF65-F5344CB8AC3E}">
+        <p14:creationId xmlns:p14="http://schemas.microsoft.com/office/powerpoint/2010/main" val="4208130215"/>
+      </p:ext>
+    </p:extLst>
+  </p:cSld>
+  <p:clrMapOvr>
+    <a:masterClrMapping/>
+  </p:clrMapOvr>
+</p:sld>
+</file>
+
 <file path=ppt/slides/slide4.xml><?xml version="1.0" encoding="utf-8"?>
 <p:sld xmlns:a="http://schemas.openxmlformats.org/drawingml/2006/main" xmlns:r="http://schemas.openxmlformats.org/officeDocument/2006/relationships" xmlns:p="http://schemas.openxmlformats.org/presentationml/2006/main">
   <p:cSld>
@@ -10961,11 +11175,7 @@
             <a:pPr lvl="1"/>
             <a:r>
               <a:rPr lang="hu-HU" dirty="0" smtClean="0"/>
-              <a:t>Closed, synchronized copies are </a:t>
-            </a:r>
-            <a:r>
-              <a:rPr lang="hu-HU" dirty="0" smtClean="0"/>
-              <a:t>unavailable</a:t>
+              <a:t>Closed, synchronized copies are unavailable</a:t>
             </a:r>
             <a:endParaRPr lang="en-US" dirty="0" smtClean="0"/>
           </a:p>
@@ -11076,11 +11286,7 @@
           <a:p>
             <a:r>
               <a:rPr lang="hu-HU" b="1" dirty="0" smtClean="0"/>
-              <a:t>Eventual </a:t>
-            </a:r>
-            <a:r>
-              <a:rPr lang="hu-HU" b="1" dirty="0" smtClean="0"/>
-              <a:t>consistency is not always enough for the user</a:t>
+              <a:t>Eventual consistency is not always enough for the user</a:t>
             </a:r>
           </a:p>
           <a:p>

</xml_diff>

<commit_message>
Added some presentation notes
</commit_message>
<xml_diff>
--- a/presentation/slides_daniel.pptx
+++ b/presentation/slides_daniel.pptx
@@ -139,7 +139,7 @@
   </p:defaultTextStyle>
   <p:extLst>
     <p:ext uri="{EFAFB233-063F-42B5-8137-9DF3F51BA10A}">
-      <p15:sldGuideLst xmlns="" xmlns:p15="http://schemas.microsoft.com/office/powerpoint/2012/main">
+      <p15:sldGuideLst xmlns:p15="http://schemas.microsoft.com/office/powerpoint/2012/main">
         <p15:guide id="1" orient="horz" pos="2160">
           <p15:clr>
             <a:srgbClr val="A4A3A4"/>
@@ -238,7 +238,7 @@
           <a:p>
             <a:fld id="{7DE1F189-47AF-4643-B438-A16D154135D4}" type="datetimeFigureOut">
               <a:rPr lang="hu-HU" smtClean="0"/>
-              <a:t>2014.03.27.</a:t>
+              <a:t>2014.03.28.</a:t>
             </a:fld>
             <a:endParaRPr lang="hu-HU"/>
           </a:p>
@@ -556,10 +556,32 @@
             </a:r>
           </a:p>
           <a:p>
-            <a:r>
-              <a:rPr lang="hu-HU" dirty="0" smtClean="0"/>
-              <a:t>1. Authors, Xerox, Bayou project</a:t>
-            </a:r>
+            <a:pPr marL="228600" indent="-228600">
+              <a:buAutoNum type="arabicPeriod"/>
+            </a:pPr>
+            <a:r>
+              <a:rPr lang="hu-HU" dirty="0" smtClean="0"/>
+              <a:t>Authors</a:t>
+            </a:r>
+            <a:r>
+              <a:rPr lang="hu-HU" dirty="0" smtClean="0"/>
+              <a:t>, Xerox, Bayou </a:t>
+            </a:r>
+            <a:r>
+              <a:rPr lang="hu-HU" dirty="0" smtClean="0"/>
+              <a:t>project</a:t>
+            </a:r>
+            <a:endParaRPr lang="en-US" dirty="0" smtClean="0"/>
+          </a:p>
+          <a:p>
+            <a:pPr marL="228600" indent="-228600">
+              <a:buAutoNum type="arabicPeriod"/>
+            </a:pPr>
+            <a:r>
+              <a:rPr lang="en-US" dirty="0" smtClean="0"/>
+              <a:t>“Replicated data consistency explained through baseball”</a:t>
+            </a:r>
+            <a:endParaRPr lang="hu-HU" dirty="0" smtClean="0"/>
           </a:p>
           <a:p>
             <a:r>
@@ -684,12 +706,40 @@
           <a:lstStyle/>
           <a:p>
             <a:r>
+              <a:rPr lang="en-US" dirty="0" smtClean="0"/>
+              <a:t>Logic: theory is one that does not contain a contradiction</a:t>
+            </a:r>
+          </a:p>
+          <a:p>
+            <a:r>
+              <a:rPr lang="en-US" dirty="0" smtClean="0"/>
+              <a:t>DB Systems :  consistent transaction is one that starts with a database in a consistent state and ends with the database in a consistent state.</a:t>
+            </a:r>
+          </a:p>
+          <a:p>
+            <a:endParaRPr lang="en-US" dirty="0" smtClean="0"/>
+          </a:p>
+          <a:p>
+            <a:r>
+              <a:rPr lang="en-US" dirty="0" smtClean="0"/>
+              <a:t>In the second, more general, sense weak consistency may be applied to any consistency model weaker than sequential consistency.</a:t>
+            </a:r>
+          </a:p>
+          <a:p>
+            <a:endParaRPr lang="en-US" dirty="0" smtClean="0"/>
+          </a:p>
+          <a:p>
+            <a:r>
               <a:rPr lang="hu-HU" dirty="0" smtClean="0"/>
               <a:t>Why</a:t>
             </a:r>
             <a:r>
               <a:rPr lang="hu-HU" baseline="0" dirty="0" smtClean="0"/>
-              <a:t> don’t we just use transactions? They could solve all of our problems.</a:t>
+              <a:t> </a:t>
+            </a:r>
+            <a:r>
+              <a:rPr lang="hu-HU" baseline="0" dirty="0" smtClean="0"/>
+              <a:t>don’t we just use transactions? They could solve all of our problems.</a:t>
             </a:r>
           </a:p>
           <a:p>
@@ -1517,7 +1567,7 @@
           <a:p>
             <a:fld id="{78F7501C-0FBA-4912-B930-6291D1759BC9}" type="datetimeFigureOut">
               <a:rPr lang="hu-HU" smtClean="0"/>
-              <a:t>2014.03.27.</a:t>
+              <a:t>2014.03.28.</a:t>
             </a:fld>
             <a:endParaRPr lang="hu-HU"/>
           </a:p>
@@ -1687,7 +1737,7 @@
           <a:p>
             <a:fld id="{78F7501C-0FBA-4912-B930-6291D1759BC9}" type="datetimeFigureOut">
               <a:rPr lang="hu-HU" smtClean="0"/>
-              <a:t>2014.03.27.</a:t>
+              <a:t>2014.03.28.</a:t>
             </a:fld>
             <a:endParaRPr lang="hu-HU"/>
           </a:p>
@@ -1867,7 +1917,7 @@
           <a:p>
             <a:fld id="{78F7501C-0FBA-4912-B930-6291D1759BC9}" type="datetimeFigureOut">
               <a:rPr lang="hu-HU" smtClean="0"/>
-              <a:t>2014.03.27.</a:t>
+              <a:t>2014.03.28.</a:t>
             </a:fld>
             <a:endParaRPr lang="hu-HU"/>
           </a:p>
@@ -2037,7 +2087,7 @@
           <a:p>
             <a:fld id="{78F7501C-0FBA-4912-B930-6291D1759BC9}" type="datetimeFigureOut">
               <a:rPr lang="hu-HU" smtClean="0"/>
-              <a:t>2014.03.27.</a:t>
+              <a:t>2014.03.28.</a:t>
             </a:fld>
             <a:endParaRPr lang="hu-HU"/>
           </a:p>
@@ -2283,7 +2333,7 @@
           <a:p>
             <a:fld id="{78F7501C-0FBA-4912-B930-6291D1759BC9}" type="datetimeFigureOut">
               <a:rPr lang="hu-HU" smtClean="0"/>
-              <a:t>2014.03.27.</a:t>
+              <a:t>2014.03.28.</a:t>
             </a:fld>
             <a:endParaRPr lang="hu-HU"/>
           </a:p>
@@ -2571,7 +2621,7 @@
           <a:p>
             <a:fld id="{78F7501C-0FBA-4912-B930-6291D1759BC9}" type="datetimeFigureOut">
               <a:rPr lang="hu-HU" smtClean="0"/>
-              <a:t>2014.03.27.</a:t>
+              <a:t>2014.03.28.</a:t>
             </a:fld>
             <a:endParaRPr lang="hu-HU"/>
           </a:p>
@@ -2993,7 +3043,7 @@
           <a:p>
             <a:fld id="{78F7501C-0FBA-4912-B930-6291D1759BC9}" type="datetimeFigureOut">
               <a:rPr lang="hu-HU" smtClean="0"/>
-              <a:t>2014.03.27.</a:t>
+              <a:t>2014.03.28.</a:t>
             </a:fld>
             <a:endParaRPr lang="hu-HU"/>
           </a:p>
@@ -3111,7 +3161,7 @@
           <a:p>
             <a:fld id="{78F7501C-0FBA-4912-B930-6291D1759BC9}" type="datetimeFigureOut">
               <a:rPr lang="hu-HU" smtClean="0"/>
-              <a:t>2014.03.27.</a:t>
+              <a:t>2014.03.28.</a:t>
             </a:fld>
             <a:endParaRPr lang="hu-HU"/>
           </a:p>
@@ -3206,7 +3256,7 @@
           <a:p>
             <a:fld id="{78F7501C-0FBA-4912-B930-6291D1759BC9}" type="datetimeFigureOut">
               <a:rPr lang="hu-HU" smtClean="0"/>
-              <a:t>2014.03.27.</a:t>
+              <a:t>2014.03.28.</a:t>
             </a:fld>
             <a:endParaRPr lang="hu-HU"/>
           </a:p>
@@ -3483,7 +3533,7 @@
           <a:p>
             <a:fld id="{78F7501C-0FBA-4912-B930-6291D1759BC9}" type="datetimeFigureOut">
               <a:rPr lang="hu-HU" smtClean="0"/>
-              <a:t>2014.03.27.</a:t>
+              <a:t>2014.03.28.</a:t>
             </a:fld>
             <a:endParaRPr lang="hu-HU"/>
           </a:p>
@@ -3736,7 +3786,7 @@
           <a:p>
             <a:fld id="{78F7501C-0FBA-4912-B930-6291D1759BC9}" type="datetimeFigureOut">
               <a:rPr lang="hu-HU" smtClean="0"/>
-              <a:t>2014.03.27.</a:t>
+              <a:t>2014.03.28.</a:t>
             </a:fld>
             <a:endParaRPr lang="hu-HU"/>
           </a:p>
@@ -3949,7 +3999,7 @@
           <a:p>
             <a:fld id="{78F7501C-0FBA-4912-B930-6291D1759BC9}" type="datetimeFigureOut">
               <a:rPr lang="hu-HU" smtClean="0"/>
-              <a:t>2014.03.27.</a:t>
+              <a:t>2014.03.28.</a:t>
             </a:fld>
             <a:endParaRPr lang="hu-HU"/>
           </a:p>
@@ -8128,7 +8178,7 @@
                       <m:sSubPr>
                         <m:ctrlPr>
                           <a:rPr lang="hu-HU" b="0" i="1" smtClean="0">
-                            <a:latin typeface="Cambria Math"/>
+                            <a:latin typeface="Cambria Math" panose="02040503050406030204" pitchFamily="18" charset="0"/>
                             <a:ea typeface="Cambria Math"/>
                           </a:rPr>
                         </m:ctrlPr>
@@ -8197,7 +8247,7 @@
                       <m:dPr>
                         <m:ctrlPr>
                           <a:rPr lang="hu-HU" b="0" i="1" smtClean="0">
-                            <a:latin typeface="Cambria Math"/>
+                            <a:latin typeface="Cambria Math" panose="02040503050406030204" pitchFamily="18" charset="0"/>
                             <a:ea typeface="Cambria Math"/>
                           </a:rPr>
                         </m:ctrlPr>
@@ -8381,8 +8431,32 @@
           <a:p>
             <a:pPr lvl="1"/>
             <a:r>
-              <a:rPr lang="hu-HU" dirty="0"/>
-              <a:t>CAP </a:t>
+              <a:rPr lang="hu-HU" dirty="0" smtClean="0"/>
+              <a:t>C</a:t>
+            </a:r>
+            <a:r>
+              <a:rPr lang="en-US" dirty="0" err="1" smtClean="0"/>
+              <a:t>onsistency</a:t>
+            </a:r>
+            <a:r>
+              <a:rPr lang="en-US" dirty="0" smtClean="0"/>
+              <a:t>- Availability-</a:t>
+            </a:r>
+            <a:r>
+              <a:rPr lang="hu-HU" dirty="0" smtClean="0"/>
+              <a:t>P</a:t>
+            </a:r>
+            <a:r>
+              <a:rPr lang="en-US" dirty="0" err="1" smtClean="0"/>
+              <a:t>artition</a:t>
+            </a:r>
+            <a:r>
+              <a:rPr lang="en-US" dirty="0" smtClean="0"/>
+              <a:t> Tolerance</a:t>
+            </a:r>
+            <a:r>
+              <a:rPr lang="hu-HU" dirty="0" smtClean="0"/>
+              <a:t> </a:t>
             </a:r>
             <a:endParaRPr lang="hu-HU" dirty="0" smtClean="0"/>
           </a:p>
@@ -8525,7 +8599,7 @@
                       <m:dPr>
                         <m:ctrlPr>
                           <a:rPr lang="hu-HU" b="0" i="1" smtClean="0">
-                            <a:latin typeface="Cambria Math"/>
+                            <a:latin typeface="Cambria Math" panose="02040503050406030204" pitchFamily="18" charset="0"/>
                           </a:rPr>
                         </m:ctrlPr>
                       </m:dPr>
@@ -8809,7 +8883,7 @@
                       <m:dPr>
                         <m:ctrlPr>
                           <a:rPr lang="hu-HU" b="0" i="1" smtClean="0">
-                            <a:latin typeface="Cambria Math"/>
+                            <a:latin typeface="Cambria Math" panose="02040503050406030204" pitchFamily="18" charset="0"/>
                           </a:rPr>
                         </m:ctrlPr>
                       </m:dPr>
@@ -8818,7 +8892,7 @@
                           <m:sSubPr>
                             <m:ctrlPr>
                               <a:rPr lang="hu-HU" b="0" i="1" smtClean="0">
-                                <a:latin typeface="Cambria Math"/>
+                                <a:latin typeface="Cambria Math" panose="02040503050406030204" pitchFamily="18" charset="0"/>
                               </a:rPr>
                             </m:ctrlPr>
                           </m:sSubPr>
@@ -8849,7 +8923,7 @@
                           <m:sSubPr>
                             <m:ctrlPr>
                               <a:rPr lang="hu-HU" b="0" i="1" smtClean="0">
-                                <a:latin typeface="Cambria Math"/>
+                                <a:latin typeface="Cambria Math" panose="02040503050406030204" pitchFamily="18" charset="0"/>
                               </a:rPr>
                             </m:ctrlPr>
                           </m:sSubPr>
@@ -8906,7 +8980,7 @@
                       <m:sSubPr>
                         <m:ctrlPr>
                           <a:rPr lang="hu-HU" b="0" i="1" smtClean="0">
-                            <a:latin typeface="Cambria Math"/>
+                            <a:latin typeface="Cambria Math" panose="02040503050406030204" pitchFamily="18" charset="0"/>
                           </a:rPr>
                         </m:ctrlPr>
                       </m:sSubPr>
@@ -9032,7 +9106,7 @@
                       <m:sSubPr>
                         <m:ctrlPr>
                           <a:rPr lang="hu-HU" i="1" smtClean="0">
-                            <a:latin typeface="Cambria Math"/>
+                            <a:latin typeface="Cambria Math" panose="02040503050406030204" pitchFamily="18" charset="0"/>
                             <a:ea typeface="Cambria Math"/>
                           </a:rPr>
                         </m:ctrlPr>
@@ -9074,7 +9148,7 @@
                       <m:dPr>
                         <m:ctrlPr>
                           <a:rPr lang="hu-HU" b="0" i="1" smtClean="0">
-                            <a:latin typeface="Cambria Math"/>
+                            <a:latin typeface="Cambria Math" panose="02040503050406030204" pitchFamily="18" charset="0"/>
                             <a:ea typeface="Cambria Math"/>
                           </a:rPr>
                         </m:ctrlPr>
@@ -9149,7 +9223,7 @@
                       <m:dPr>
                         <m:ctrlPr>
                           <a:rPr lang="hu-HU" b="0" i="1" smtClean="0">
-                            <a:latin typeface="Cambria Math"/>
+                            <a:latin typeface="Cambria Math" panose="02040503050406030204" pitchFamily="18" charset="0"/>
                             <a:ea typeface="Cambria Math"/>
                           </a:rPr>
                         </m:ctrlPr>
@@ -9159,7 +9233,7 @@
                           <m:sSubPr>
                             <m:ctrlPr>
                               <a:rPr lang="hu-HU" b="0" i="1" smtClean="0">
-                                <a:latin typeface="Cambria Math"/>
+                                <a:latin typeface="Cambria Math" panose="02040503050406030204" pitchFamily="18" charset="0"/>
                                 <a:ea typeface="Cambria Math"/>
                               </a:rPr>
                             </m:ctrlPr>
@@ -9194,7 +9268,7 @@
                           <m:sSubPr>
                             <m:ctrlPr>
                               <a:rPr lang="hu-HU" b="0" i="1" smtClean="0">
-                                <a:latin typeface="Cambria Math"/>
+                                <a:latin typeface="Cambria Math" panose="02040503050406030204" pitchFamily="18" charset="0"/>
                                 <a:ea typeface="Cambria Math"/>
                               </a:rPr>
                             </m:ctrlPr>
@@ -9231,7 +9305,7 @@
                       <m:sSubPr>
                         <m:ctrlPr>
                           <a:rPr lang="hu-HU" b="0" i="1" smtClean="0">
-                            <a:latin typeface="Cambria Math"/>
+                            <a:latin typeface="Cambria Math" panose="02040503050406030204" pitchFamily="18" charset="0"/>
                             <a:ea typeface="Cambria Math"/>
                           </a:rPr>
                         </m:ctrlPr>
@@ -9719,7 +9793,7 @@
                       <m:dPr>
                         <m:ctrlPr>
                           <a:rPr lang="hu-HU" b="0" i="1" smtClean="0">
-                            <a:latin typeface="Cambria Math"/>
+                            <a:latin typeface="Cambria Math" panose="02040503050406030204" pitchFamily="18" charset="0"/>
                           </a:rPr>
                         </m:ctrlPr>
                       </m:dPr>
@@ -9789,7 +9863,7 @@
                         <m:endChr m:val="}"/>
                         <m:ctrlPr>
                           <a:rPr lang="hu-HU" b="0" i="1" smtClean="0">
-                            <a:latin typeface="Cambria Math"/>
+                            <a:latin typeface="Cambria Math" panose="02040503050406030204" pitchFamily="18" charset="0"/>
                             <a:ea typeface="Cambria Math"/>
                           </a:rPr>
                         </m:ctrlPr>
@@ -9799,7 +9873,7 @@
                           <m:sSubPr>
                             <m:ctrlPr>
                               <a:rPr lang="hu-HU" b="0" i="1" smtClean="0">
-                                <a:latin typeface="Cambria Math"/>
+                                <a:latin typeface="Cambria Math" panose="02040503050406030204" pitchFamily="18" charset="0"/>
                                 <a:ea typeface="Cambria Math"/>
                               </a:rPr>
                             </m:ctrlPr>
@@ -10871,8 +10945,20 @@
           </a:p>
           <a:p>
             <a:r>
+              <a:rPr lang="en-US" b="1" dirty="0" smtClean="0"/>
+              <a:t>BUT</a:t>
+            </a:r>
+            <a:r>
+              <a:rPr lang="en-US" dirty="0" smtClean="0"/>
+              <a:t> </a:t>
+            </a:r>
+            <a:r>
+              <a:rPr lang="hu-HU" dirty="0" smtClean="0"/>
+              <a:t>Lack </a:t>
+            </a:r>
+            <a:r>
               <a:rPr lang="hu-HU" dirty="0"/>
-              <a:t>Lack of guarantees are confusing to users</a:t>
+              <a:t>of guarantees are confusing to users</a:t>
             </a:r>
           </a:p>
           <a:p>
@@ -11034,35 +11120,23 @@
             <p:ph type="title"/>
           </p:nvPr>
         </p:nvSpPr>
-        <p:spPr/>
-        <p:txBody>
-          <a:bodyPr/>
+        <p:spPr>
+          <a:xfrm>
+            <a:off x="457200" y="2996952"/>
+            <a:ext cx="8229600" cy="1143000"/>
+          </a:xfrm>
+        </p:spPr>
+        <p:txBody>
+          <a:bodyPr>
+            <a:normAutofit/>
+          </a:bodyPr>
           <a:lstStyle/>
           <a:p>
             <a:r>
-              <a:rPr lang="hu-HU" dirty="0" smtClean="0"/>
+              <a:rPr lang="hu-HU" sz="6000" dirty="0" smtClean="0"/>
               <a:t>Questions?</a:t>
             </a:r>
-            <a:endParaRPr lang="hu-HU" dirty="0"/>
-          </a:p>
-        </p:txBody>
-      </p:sp>
-      <p:sp>
-        <p:nvSpPr>
-          <p:cNvPr id="4" name="Content Placeholder 3"/>
-          <p:cNvSpPr>
-            <a:spLocks noGrp="1"/>
-          </p:cNvSpPr>
-          <p:nvPr>
-            <p:ph idx="1"/>
-          </p:nvPr>
-        </p:nvSpPr>
-        <p:spPr/>
-        <p:txBody>
-          <a:bodyPr/>
-          <a:lstStyle/>
-          <a:p>
-            <a:endParaRPr lang="hu-HU" dirty="0"/>
+            <a:endParaRPr lang="hu-HU" sz="6000" dirty="0"/>
           </a:p>
         </p:txBody>
       </p:sp>
@@ -11108,12 +11182,22 @@
         </p:nvSpPr>
         <p:spPr/>
         <p:txBody>
-          <a:bodyPr/>
+          <a:bodyPr>
+            <a:normAutofit fontScale="90000"/>
+          </a:bodyPr>
           <a:lstStyle/>
           <a:p>
             <a:r>
-              <a:rPr lang="hu-HU" dirty="0" smtClean="0"/>
-              <a:t>Mobile Computing Aspects</a:t>
+              <a:rPr lang="en-US" dirty="0" smtClean="0"/>
+              <a:t>Problem: </a:t>
+            </a:r>
+            <a:r>
+              <a:rPr lang="hu-HU" dirty="0" smtClean="0"/>
+              <a:t>Mobile </a:t>
+            </a:r>
+            <a:r>
+              <a:rPr lang="hu-HU" dirty="0" smtClean="0"/>
+              <a:t>Computing Aspects</a:t>
             </a:r>
             <a:endParaRPr lang="hu-HU" dirty="0"/>
           </a:p>
@@ -11280,8 +11364,20 @@
             <a:pPr lvl="1"/>
             <a:r>
               <a:rPr lang="en-US" dirty="0" smtClean="0"/>
-              <a:t>You don’t live in an eventually consistent world</a:t>
-            </a:r>
+              <a:t>You don’t live in an eventually consistent </a:t>
+            </a:r>
+            <a:r>
+              <a:rPr lang="en-US" dirty="0" smtClean="0"/>
+              <a:t>world</a:t>
+            </a:r>
+          </a:p>
+          <a:p>
+            <a:pPr lvl="1"/>
+            <a:r>
+              <a:rPr lang="en-US" dirty="0" smtClean="0"/>
+              <a:t>You don’t want to live in it either.</a:t>
+            </a:r>
+            <a:endParaRPr lang="en-US" dirty="0" smtClean="0"/>
           </a:p>
           <a:p>
             <a:r>

</xml_diff>

<commit_message>
Final version for presentation
</commit_message>
<xml_diff>
--- a/presentation/slides_daniel.pptx
+++ b/presentation/slides_daniel.pptx
@@ -570,6 +570,22 @@
             <a:r>
               <a:rPr lang="hu-HU" dirty="0" smtClean="0"/>
               <a:t>project</a:t>
+            </a:r>
+            <a:r>
+              <a:rPr lang="en-US" dirty="0" smtClean="0"/>
+              <a:t> “Democratic weak consistent</a:t>
+            </a:r>
+            <a:r>
+              <a:rPr lang="en-US" baseline="0" dirty="0" smtClean="0"/>
+              <a:t> distributed systems with requires </a:t>
+            </a:r>
+            <a:r>
+              <a:rPr lang="en-US" baseline="0" smtClean="0"/>
+              <a:t>user interaction”</a:t>
+            </a:r>
+            <a:r>
+              <a:rPr lang="en-US" smtClean="0"/>
+              <a:t> </a:t>
             </a:r>
             <a:endParaRPr lang="en-US" dirty="0" smtClean="0"/>
           </a:p>
@@ -4685,6 +4701,14 @@
   <p:clrMapOvr>
     <a:masterClrMapping/>
   </p:clrMapOvr>
+  <mc:AlternateContent xmlns:mc="http://schemas.openxmlformats.org/markup-compatibility/2006">
+    <mc:Choice xmlns:p14="http://schemas.microsoft.com/office/powerpoint/2010/main" Requires="p14">
+      <p:transition spd="slow" p14:dur="2000"/>
+    </mc:Choice>
+    <mc:Fallback>
+      <p:transition spd="slow"/>
+    </mc:Fallback>
+  </mc:AlternateContent>
   <p:timing>
     <p:tnLst>
       <p:par>
@@ -7923,8 +7947,13 @@
             </a:r>
             <a:r>
               <a:rPr lang="hu-HU" dirty="0" smtClean="0"/>
-              <a:t>utomatic address book backup service – shouldn’t overwrite/remove previous addresses</a:t>
-            </a:r>
+              <a:t>utomatic address book backup service – shouldn’t overwrite/remove previous </a:t>
+            </a:r>
+            <a:r>
+              <a:rPr lang="en-US" dirty="0" smtClean="0"/>
+              <a:t>versions</a:t>
+            </a:r>
+            <a:endParaRPr lang="hu-HU" dirty="0" smtClean="0"/>
           </a:p>
           <a:p>
             <a:endParaRPr lang="hu-HU" dirty="0"/>
@@ -8440,7 +8469,7 @@
             </a:r>
             <a:r>
               <a:rPr lang="en-US" dirty="0" smtClean="0"/>
-              <a:t>- Availability-</a:t>
+              <a:t>-Availability-</a:t>
             </a:r>
             <a:r>
               <a:rPr lang="hu-HU" dirty="0" smtClean="0"/>

</xml_diff>